<commit_message>
Starting to take care of new screen dumps in documentation
git-svn-id: https://overture.svn.sourceforge.net/svnroot/overture/trunk@2527 2b2d4d09-c93c-414a-ad04-6e973f5c1cff
</commit_message>
<xml_diff>
--- a/documentation/tutorials/VDM++OvertureTutorial/figures/OvertureAndDebuggingPerspective.pptx
+++ b/documentation/tutorials/VDM++OvertureTutorial/figures/OvertureAndDebuggingPerspective.pptx
@@ -292,7 +292,7 @@
             <a:fld id="{6C9C7907-59E3-4B00-BADD-F3C6AE052768}" type="datetimeFigureOut">
               <a:rPr lang="da-DK" smtClean="0"/>
               <a:pPr/>
-              <a:t>03-01-2010</a:t>
+              <a:t>13-02-2011</a:t>
             </a:fld>
             <a:endParaRPr lang="da-DK"/>
           </a:p>
@@ -335,7 +335,7 @@
             <a:fld id="{78AD4C09-F243-4A95-8351-89FCE95C2157}" type="slidenum">
               <a:rPr lang="da-DK" smtClean="0"/>
               <a:pPr/>
-              <a:t>‹nr.›</a:t>
+              <a:t>‹#›</a:t>
             </a:fld>
             <a:endParaRPr lang="da-DK"/>
           </a:p>
@@ -459,7 +459,7 @@
             <a:fld id="{6C9C7907-59E3-4B00-BADD-F3C6AE052768}" type="datetimeFigureOut">
               <a:rPr lang="da-DK" smtClean="0"/>
               <a:pPr/>
-              <a:t>03-01-2010</a:t>
+              <a:t>13-02-2011</a:t>
             </a:fld>
             <a:endParaRPr lang="da-DK"/>
           </a:p>
@@ -502,7 +502,7 @@
             <a:fld id="{78AD4C09-F243-4A95-8351-89FCE95C2157}" type="slidenum">
               <a:rPr lang="da-DK" smtClean="0"/>
               <a:pPr/>
-              <a:t>‹nr.›</a:t>
+              <a:t>‹#›</a:t>
             </a:fld>
             <a:endParaRPr lang="da-DK"/>
           </a:p>
@@ -636,7 +636,7 @@
             <a:fld id="{6C9C7907-59E3-4B00-BADD-F3C6AE052768}" type="datetimeFigureOut">
               <a:rPr lang="da-DK" smtClean="0"/>
               <a:pPr/>
-              <a:t>03-01-2010</a:t>
+              <a:t>13-02-2011</a:t>
             </a:fld>
             <a:endParaRPr lang="da-DK"/>
           </a:p>
@@ -679,7 +679,7 @@
             <a:fld id="{78AD4C09-F243-4A95-8351-89FCE95C2157}" type="slidenum">
               <a:rPr lang="da-DK" smtClean="0"/>
               <a:pPr/>
-              <a:t>‹nr.›</a:t>
+              <a:t>‹#›</a:t>
             </a:fld>
             <a:endParaRPr lang="da-DK"/>
           </a:p>
@@ -803,7 +803,7 @@
             <a:fld id="{6C9C7907-59E3-4B00-BADD-F3C6AE052768}" type="datetimeFigureOut">
               <a:rPr lang="da-DK" smtClean="0"/>
               <a:pPr/>
-              <a:t>03-01-2010</a:t>
+              <a:t>13-02-2011</a:t>
             </a:fld>
             <a:endParaRPr lang="da-DK"/>
           </a:p>
@@ -846,7 +846,7 @@
             <a:fld id="{78AD4C09-F243-4A95-8351-89FCE95C2157}" type="slidenum">
               <a:rPr lang="da-DK" smtClean="0"/>
               <a:pPr/>
-              <a:t>‹nr.›</a:t>
+              <a:t>‹#›</a:t>
             </a:fld>
             <a:endParaRPr lang="da-DK"/>
           </a:p>
@@ -1046,7 +1046,7 @@
             <a:fld id="{6C9C7907-59E3-4B00-BADD-F3C6AE052768}" type="datetimeFigureOut">
               <a:rPr lang="da-DK" smtClean="0"/>
               <a:pPr/>
-              <a:t>03-01-2010</a:t>
+              <a:t>13-02-2011</a:t>
             </a:fld>
             <a:endParaRPr lang="da-DK"/>
           </a:p>
@@ -1089,7 +1089,7 @@
             <a:fld id="{78AD4C09-F243-4A95-8351-89FCE95C2157}" type="slidenum">
               <a:rPr lang="da-DK" smtClean="0"/>
               <a:pPr/>
-              <a:t>‹nr.›</a:t>
+              <a:t>‹#›</a:t>
             </a:fld>
             <a:endParaRPr lang="da-DK"/>
           </a:p>
@@ -1331,7 +1331,7 @@
             <a:fld id="{6C9C7907-59E3-4B00-BADD-F3C6AE052768}" type="datetimeFigureOut">
               <a:rPr lang="da-DK" smtClean="0"/>
               <a:pPr/>
-              <a:t>03-01-2010</a:t>
+              <a:t>13-02-2011</a:t>
             </a:fld>
             <a:endParaRPr lang="da-DK"/>
           </a:p>
@@ -1374,7 +1374,7 @@
             <a:fld id="{78AD4C09-F243-4A95-8351-89FCE95C2157}" type="slidenum">
               <a:rPr lang="da-DK" smtClean="0"/>
               <a:pPr/>
-              <a:t>‹nr.›</a:t>
+              <a:t>‹#›</a:t>
             </a:fld>
             <a:endParaRPr lang="da-DK"/>
           </a:p>
@@ -1750,7 +1750,7 @@
             <a:fld id="{6C9C7907-59E3-4B00-BADD-F3C6AE052768}" type="datetimeFigureOut">
               <a:rPr lang="da-DK" smtClean="0"/>
               <a:pPr/>
-              <a:t>03-01-2010</a:t>
+              <a:t>13-02-2011</a:t>
             </a:fld>
             <a:endParaRPr lang="da-DK"/>
           </a:p>
@@ -1793,7 +1793,7 @@
             <a:fld id="{78AD4C09-F243-4A95-8351-89FCE95C2157}" type="slidenum">
               <a:rPr lang="da-DK" smtClean="0"/>
               <a:pPr/>
-              <a:t>‹nr.›</a:t>
+              <a:t>‹#›</a:t>
             </a:fld>
             <a:endParaRPr lang="da-DK"/>
           </a:p>
@@ -1865,7 +1865,7 @@
             <a:fld id="{6C9C7907-59E3-4B00-BADD-F3C6AE052768}" type="datetimeFigureOut">
               <a:rPr lang="da-DK" smtClean="0"/>
               <a:pPr/>
-              <a:t>03-01-2010</a:t>
+              <a:t>13-02-2011</a:t>
             </a:fld>
             <a:endParaRPr lang="da-DK"/>
           </a:p>
@@ -1908,7 +1908,7 @@
             <a:fld id="{78AD4C09-F243-4A95-8351-89FCE95C2157}" type="slidenum">
               <a:rPr lang="da-DK" smtClean="0"/>
               <a:pPr/>
-              <a:t>‹nr.›</a:t>
+              <a:t>‹#›</a:t>
             </a:fld>
             <a:endParaRPr lang="da-DK"/>
           </a:p>
@@ -1957,7 +1957,7 @@
             <a:fld id="{6C9C7907-59E3-4B00-BADD-F3C6AE052768}" type="datetimeFigureOut">
               <a:rPr lang="da-DK" smtClean="0"/>
               <a:pPr/>
-              <a:t>03-01-2010</a:t>
+              <a:t>13-02-2011</a:t>
             </a:fld>
             <a:endParaRPr lang="da-DK"/>
           </a:p>
@@ -2000,7 +2000,7 @@
             <a:fld id="{78AD4C09-F243-4A95-8351-89FCE95C2157}" type="slidenum">
               <a:rPr lang="da-DK" smtClean="0"/>
               <a:pPr/>
-              <a:t>‹nr.›</a:t>
+              <a:t>‹#›</a:t>
             </a:fld>
             <a:endParaRPr lang="da-DK"/>
           </a:p>
@@ -2231,7 +2231,7 @@
             <a:fld id="{6C9C7907-59E3-4B00-BADD-F3C6AE052768}" type="datetimeFigureOut">
               <a:rPr lang="da-DK" smtClean="0"/>
               <a:pPr/>
-              <a:t>03-01-2010</a:t>
+              <a:t>13-02-2011</a:t>
             </a:fld>
             <a:endParaRPr lang="da-DK"/>
           </a:p>
@@ -2274,7 +2274,7 @@
             <a:fld id="{78AD4C09-F243-4A95-8351-89FCE95C2157}" type="slidenum">
               <a:rPr lang="da-DK" smtClean="0"/>
               <a:pPr/>
-              <a:t>‹nr.›</a:t>
+              <a:t>‹#›</a:t>
             </a:fld>
             <a:endParaRPr lang="da-DK"/>
           </a:p>
@@ -2481,7 +2481,7 @@
             <a:fld id="{6C9C7907-59E3-4B00-BADD-F3C6AE052768}" type="datetimeFigureOut">
               <a:rPr lang="da-DK" smtClean="0"/>
               <a:pPr/>
-              <a:t>03-01-2010</a:t>
+              <a:t>13-02-2011</a:t>
             </a:fld>
             <a:endParaRPr lang="da-DK"/>
           </a:p>
@@ -2524,7 +2524,7 @@
             <a:fld id="{78AD4C09-F243-4A95-8351-89FCE95C2157}" type="slidenum">
               <a:rPr lang="da-DK" smtClean="0"/>
               <a:pPr/>
-              <a:t>‹nr.›</a:t>
+              <a:t>‹#›</a:t>
             </a:fld>
             <a:endParaRPr lang="da-DK"/>
           </a:p>
@@ -2691,7 +2691,7 @@
             <a:fld id="{6C9C7907-59E3-4B00-BADD-F3C6AE052768}" type="datetimeFigureOut">
               <a:rPr lang="da-DK" smtClean="0"/>
               <a:pPr/>
-              <a:t>03-01-2010</a:t>
+              <a:t>13-02-2011</a:t>
             </a:fld>
             <a:endParaRPr lang="da-DK"/>
           </a:p>
@@ -2770,7 +2770,7 @@
             <a:fld id="{78AD4C09-F243-4A95-8351-89FCE95C2157}" type="slidenum">
               <a:rPr lang="da-DK" smtClean="0"/>
               <a:pPr/>
-              <a:t>‹nr.›</a:t>
+              <a:t>‹#›</a:t>
             </a:fld>
             <a:endParaRPr lang="da-DK"/>
           </a:p>
@@ -3064,34 +3064,32 @@
       </p:grpSpPr>
       <p:pic>
         <p:nvPicPr>
-          <p:cNvPr id="1026" name="Picture 2"/>
+          <p:cNvPr id="2" name="Picture 1"/>
           <p:cNvPicPr>
-            <a:picLocks noChangeAspect="1" noChangeArrowheads="1"/>
+            <a:picLocks noChangeAspect="1"/>
           </p:cNvPicPr>
           <p:nvPr/>
         </p:nvPicPr>
         <p:blipFill>
-          <a:blip r:embed="rId2" cstate="print"/>
-          <a:srcRect/>
+          <a:blip r:embed="rId2">
+            <a:extLst>
+              <a:ext uri="{28A0092B-C50C-407E-A947-70E740481C1C}">
+                <a14:useLocalDpi xmlns:a14="http://schemas.microsoft.com/office/drawing/2010/main" val="0"/>
+              </a:ext>
+            </a:extLst>
+          </a:blip>
           <a:stretch>
             <a:fillRect/>
           </a:stretch>
         </p:blipFill>
-        <p:spPr bwMode="auto">
+        <p:spPr>
           <a:xfrm>
-            <a:off x="0" y="0"/>
-            <a:ext cx="13716000" cy="8039100"/>
+            <a:off x="0" y="1192403"/>
+            <a:ext cx="9144000" cy="4473194"/>
           </a:xfrm>
           <a:prstGeom prst="rect">
             <a:avLst/>
           </a:prstGeom>
-          <a:noFill/>
-          <a:ln w="9525">
-            <a:noFill/>
-            <a:miter lim="800000"/>
-            <a:headEnd/>
-            <a:tailEnd/>
-          </a:ln>
         </p:spPr>
       </p:pic>
       <p:sp>
@@ -3102,13 +3100,13 @@
         </p:nvSpPr>
         <p:spPr>
           <a:xfrm>
-            <a:off x="1643042" y="642918"/>
-            <a:ext cx="1000132" cy="357190"/>
+            <a:off x="588458" y="2132856"/>
+            <a:ext cx="1631104" cy="357190"/>
           </a:xfrm>
           <a:prstGeom prst="wedgeRectCallout">
             <a:avLst>
-              <a:gd name="adj1" fmla="val -122508"/>
-              <a:gd name="adj2" fmla="val 9552"/>
+              <a:gd name="adj1" fmla="val -29074"/>
+              <a:gd name="adj2" fmla="val 168027"/>
             </a:avLst>
           </a:prstGeom>
           <a:solidFill>
@@ -3136,7 +3134,7 @@
             <a:pPr algn="ctr"/>
             <a:r>
               <a:rPr lang="da-DK" dirty="0" smtClean="0"/>
-              <a:t>Project</a:t>
+              <a:t>VDM Projects</a:t>
             </a:r>
             <a:endParaRPr lang="da-DK" dirty="0"/>
           </a:p>
@@ -3150,13 +3148,13 @@
         </p:nvSpPr>
         <p:spPr>
           <a:xfrm>
-            <a:off x="1500166" y="1857364"/>
-            <a:ext cx="1428760" cy="357190"/>
+            <a:off x="1000100" y="4052922"/>
+            <a:ext cx="1898250" cy="357190"/>
           </a:xfrm>
           <a:prstGeom prst="wedgeRectCallout">
             <a:avLst>
-              <a:gd name="adj1" fmla="val -60142"/>
-              <a:gd name="adj2" fmla="val -143721"/>
+              <a:gd name="adj1" fmla="val -67788"/>
+              <a:gd name="adj2" fmla="val -78705"/>
             </a:avLst>
           </a:prstGeom>
         </p:spPr>
@@ -3181,7 +3179,11 @@
             <a:pPr algn="ctr"/>
             <a:r>
               <a:rPr lang="da-DK" dirty="0" smtClean="0"/>
-              <a:t>Model files</a:t>
+              <a:t>VDM Model </a:t>
+            </a:r>
+            <a:r>
+              <a:rPr lang="da-DK" dirty="0" smtClean="0"/>
+              <a:t>files</a:t>
             </a:r>
             <a:endParaRPr lang="da-DK" dirty="0"/>
           </a:p>
@@ -3195,13 +3197,13 @@
         </p:nvSpPr>
         <p:spPr>
           <a:xfrm>
-            <a:off x="7858148" y="1000108"/>
-            <a:ext cx="1000132" cy="357190"/>
+            <a:off x="5364088" y="4071065"/>
+            <a:ext cx="1512168" cy="357190"/>
           </a:xfrm>
           <a:prstGeom prst="wedgeRectCallout">
             <a:avLst>
-              <a:gd name="adj1" fmla="val -90581"/>
-              <a:gd name="adj2" fmla="val 21742"/>
+              <a:gd name="adj1" fmla="val -39710"/>
+              <a:gd name="adj2" fmla="val -96098"/>
             </a:avLst>
           </a:prstGeom>
         </p:spPr>
@@ -3226,7 +3228,7 @@
             <a:pPr algn="ctr"/>
             <a:r>
               <a:rPr lang="da-DK" dirty="0" smtClean="0"/>
-              <a:t>Editor</a:t>
+              <a:t>VDM Editors</a:t>
             </a:r>
             <a:endParaRPr lang="da-DK" dirty="0"/>
           </a:p>
@@ -3240,7 +3242,7 @@
         </p:nvSpPr>
         <p:spPr>
           <a:xfrm>
-            <a:off x="11287172" y="2643182"/>
+            <a:off x="7774441" y="4231517"/>
             <a:ext cx="1357322" cy="357190"/>
           </a:xfrm>
           <a:prstGeom prst="wedgeRectCallout">
@@ -3293,7 +3295,7 @@
         </p:nvSpPr>
         <p:spPr>
           <a:xfrm>
-            <a:off x="6215074" y="6679405"/>
+            <a:off x="2898350" y="4725144"/>
             <a:ext cx="1500198" cy="357190"/>
           </a:xfrm>
           <a:prstGeom prst="wedgeRectCallout">
@@ -3342,7 +3344,7 @@
         </p:nvSpPr>
         <p:spPr>
           <a:xfrm>
-            <a:off x="7858148" y="142852"/>
+            <a:off x="2915816" y="1628800"/>
             <a:ext cx="2071702" cy="357190"/>
           </a:xfrm>
           <a:prstGeom prst="wedgeRectCallout">

</xml_diff>